<commit_message>
week 1 updates for 2023
</commit_message>
<xml_diff>
--- a/docs/PSYC121/data/Week_1/week1_lecture_student_slides.pptx
+++ b/docs/PSYC121/data/Week_1/week1_lecture_student_slides.pptx
@@ -4734,7 +4734,7 @@
                       <a:effectLst/>
                       <a:extLst>
                         <a:ext uri="{91240B29-F687-4f45-9708-019B960494DF}">
-                          <a14:hiddenLine xmlns:a14="http://schemas.microsoft.com/office/drawing/2010/main" xmlns="" w="9525">
+                          <a14:hiddenLine xmlns="" xmlns:a14="http://schemas.microsoft.com/office/drawing/2010/main" w="9525">
                             <a:solidFill>
                               <a:schemeClr val="bg1"/>
                             </a:solidFill>
@@ -4744,7 +4744,7 @@
                           </a14:hiddenLine>
                         </a:ext>
                         <a:ext uri="{AF507438-7753-43e0-B8FC-AC1667EBCBE1}">
-                          <a14:hiddenEffects xmlns:a14="http://schemas.microsoft.com/office/drawing/2010/main" xmlns="">
+                          <a14:hiddenEffects xmlns="" xmlns:a14="http://schemas.microsoft.com/office/drawing/2010/main">
                             <a:effectLst>
                               <a:outerShdw blurRad="63500" dist="38099" dir="2700000" algn="ctr" rotWithShape="0">
                                 <a:schemeClr val="bg2">
@@ -9002,8 +9002,12 @@
           <a:p>
             <a:pPr lvl="1"/>
             <a:r>
+              <a:rPr lang="en-GB"/>
+              <a:t>Nominal </a:t>
+            </a:r>
+            <a:r>
               <a:rPr lang="en-GB" dirty="0"/>
-              <a:t>An A-level grade award Nominal variables are also referred to as categorical or qualitative variables </a:t>
+              <a:t>variables are also referred to as categorical or qualitative variables </a:t>
             </a:r>
             <a:endParaRPr lang="en-US" dirty="0"/>
           </a:p>

</xml_diff>